<commit_message>
implemented Reliability and Security changes in System A
</commit_message>
<xml_diff>
--- a/doc/Architectural Drivers for A3.pptx
+++ b/doc/Architectural Drivers for A3.pptx
@@ -3099,7 +3099,7 @@
           <a:p>
             <a:fld id="{A61BF238-8075-0549-AF03-FB7E63399B94}" type="datetimeFigureOut">
               <a:rPr lang="en-US" smtClean="0"/>
-              <a:t>3/19/16</a:t>
+              <a:t>3/29/16</a:t>
             </a:fld>
             <a:endParaRPr lang="en-US"/>
           </a:p>
@@ -3342,7 +3342,7 @@
           <a:p>
             <a:fld id="{A61BF238-8075-0549-AF03-FB7E63399B94}" type="datetimeFigureOut">
               <a:rPr lang="en-US" smtClean="0"/>
-              <a:t>3/19/16</a:t>
+              <a:t>3/29/16</a:t>
             </a:fld>
             <a:endParaRPr lang="en-US"/>
           </a:p>
@@ -3561,7 +3561,7 @@
           <a:p>
             <a:fld id="{A61BF238-8075-0549-AF03-FB7E63399B94}" type="datetimeFigureOut">
               <a:rPr lang="en-US" smtClean="0"/>
-              <a:t>3/19/16</a:t>
+              <a:t>3/29/16</a:t>
             </a:fld>
             <a:endParaRPr lang="en-US"/>
           </a:p>
@@ -4005,7 +4005,7 @@
           <a:p>
             <a:fld id="{A61BF238-8075-0549-AF03-FB7E63399B94}" type="datetimeFigureOut">
               <a:rPr lang="en-US" smtClean="0"/>
-              <a:t>3/19/16</a:t>
+              <a:t>3/29/16</a:t>
             </a:fld>
             <a:endParaRPr lang="en-US"/>
           </a:p>
@@ -4619,7 +4619,7 @@
           <a:p>
             <a:fld id="{A61BF238-8075-0549-AF03-FB7E63399B94}" type="datetimeFigureOut">
               <a:rPr lang="en-US" smtClean="0"/>
-              <a:t>3/19/16</a:t>
+              <a:t>3/29/16</a:t>
             </a:fld>
             <a:endParaRPr lang="en-US"/>
           </a:p>
@@ -4955,7 +4955,7 @@
           <a:p>
             <a:fld id="{A61BF238-8075-0549-AF03-FB7E63399B94}" type="datetimeFigureOut">
               <a:rPr lang="en-US" smtClean="0"/>
-              <a:t>3/19/16</a:t>
+              <a:t>3/29/16</a:t>
             </a:fld>
             <a:endParaRPr lang="en-US"/>
           </a:p>
@@ -5431,7 +5431,7 @@
           <a:p>
             <a:fld id="{A61BF238-8075-0549-AF03-FB7E63399B94}" type="datetimeFigureOut">
               <a:rPr lang="en-US" smtClean="0"/>
-              <a:t>3/19/16</a:t>
+              <a:t>3/29/16</a:t>
             </a:fld>
             <a:endParaRPr lang="en-US"/>
           </a:p>
@@ -5588,7 +5588,7 @@
           <a:p>
             <a:fld id="{A61BF238-8075-0549-AF03-FB7E63399B94}" type="datetimeFigureOut">
               <a:rPr lang="en-US" smtClean="0"/>
-              <a:t>3/19/16</a:t>
+              <a:t>3/29/16</a:t>
             </a:fld>
             <a:endParaRPr lang="en-US"/>
           </a:p>
@@ -5722,7 +5722,7 @@
           <a:p>
             <a:fld id="{A61BF238-8075-0549-AF03-FB7E63399B94}" type="datetimeFigureOut">
               <a:rPr lang="en-US" smtClean="0"/>
-              <a:t>3/19/16</a:t>
+              <a:t>3/29/16</a:t>
             </a:fld>
             <a:endParaRPr lang="en-US"/>
           </a:p>
@@ -6088,7 +6088,7 @@
           <a:p>
             <a:fld id="{A61BF238-8075-0549-AF03-FB7E63399B94}" type="datetimeFigureOut">
               <a:rPr lang="en-US" smtClean="0"/>
-              <a:t>3/19/16</a:t>
+              <a:t>3/29/16</a:t>
             </a:fld>
             <a:endParaRPr lang="en-US"/>
           </a:p>
@@ -6516,7 +6516,7 @@
           <a:p>
             <a:fld id="{A61BF238-8075-0549-AF03-FB7E63399B94}" type="datetimeFigureOut">
               <a:rPr lang="en-US" smtClean="0"/>
-              <a:t>3/19/16</a:t>
+              <a:t>3/29/16</a:t>
             </a:fld>
             <a:endParaRPr lang="en-US"/>
           </a:p>
@@ -8017,29 +8017,8 @@
                 <a:ea typeface="Garamond" charset="0"/>
                 <a:cs typeface="Garamond" charset="0"/>
               </a:rPr>
-              <a:t>The monitor should notify the user if it doesn’t receive an acknowledgement from the control</a:t>
-            </a:r>
-            <a:r>
-              <a:rPr lang="en-US" sz="1600" dirty="0" smtClean="0">
-                <a:latin typeface="Garamond" charset="0"/>
-                <a:ea typeface="Garamond" charset="0"/>
-                <a:cs typeface="Garamond" charset="0"/>
-              </a:rPr>
-              <a:t>ler </a:t>
-            </a:r>
-            <a:r>
-              <a:rPr lang="en-US" sz="1600" dirty="0" smtClean="0">
-                <a:latin typeface="Garamond" charset="0"/>
-                <a:ea typeface="Garamond" charset="0"/>
-                <a:cs typeface="Garamond" charset="0"/>
-              </a:rPr>
-              <a:t>after the monitor sends a message to the controller.</a:t>
-            </a:r>
-            <a:endParaRPr lang="en-US" sz="1600" dirty="0" smtClean="0">
-              <a:latin typeface="Garamond" charset="0"/>
-              <a:ea typeface="Garamond" charset="0"/>
-              <a:cs typeface="Garamond" charset="0"/>
-            </a:endParaRPr>
+              <a:t>The monitor should notify the user if it doesn’t receive an acknowledgement from the controller after the monitor sends a message to the controller.</a:t>
+            </a:r>
           </a:p>
         </p:txBody>
       </p:sp>
@@ -8145,23 +8124,11 @@
                     <a:p>
                       <a:r>
                         <a:rPr lang="en-US" sz="1600" dirty="0" smtClean="0"/>
-                        <a:t>Not receiving </a:t>
-                      </a:r>
-                      <a:r>
-                        <a:rPr lang="en-US" sz="1600" dirty="0" smtClean="0"/>
-                        <a:t>acknowledgement</a:t>
+                        <a:t>Not receiving acknowledgement</a:t>
                       </a:r>
                       <a:r>
                         <a:rPr lang="en-US" sz="1600" baseline="0" dirty="0" smtClean="0"/>
-                        <a:t> from </a:t>
-                      </a:r>
-                      <a:r>
-                        <a:rPr lang="en-US" sz="1600" baseline="0" dirty="0" smtClean="0"/>
-                        <a:t>a </a:t>
-                      </a:r>
-                      <a:r>
-                        <a:rPr lang="en-US" sz="1600" baseline="0" dirty="0" smtClean="0"/>
-                        <a:t>controller</a:t>
+                        <a:t> from a controller</a:t>
                       </a:r>
                       <a:endParaRPr lang="en-US" sz="1600" dirty="0"/>
                     </a:p>
@@ -8251,11 +8218,7 @@
                     <a:p>
                       <a:r>
                         <a:rPr lang="en-US" sz="1600" dirty="0" smtClean="0"/>
-                        <a:t>Notify </a:t>
-                      </a:r>
-                      <a:r>
-                        <a:rPr lang="en-US" sz="1600" dirty="0" smtClean="0"/>
-                        <a:t>user</a:t>
+                        <a:t>Notify user</a:t>
                       </a:r>
                       <a:endParaRPr lang="en-US" sz="1600" dirty="0"/>
                     </a:p>
@@ -8488,11 +8451,6 @@
               </a:rPr>
               <a:t>Cannot be achieved due to technical constraint </a:t>
             </a:r>
-            <a:endParaRPr lang="en-US" sz="1600" dirty="0" smtClean="0">
-              <a:latin typeface="Garamond" charset="0"/>
-              <a:ea typeface="Garamond" charset="0"/>
-              <a:cs typeface="Garamond" charset="0"/>
-            </a:endParaRPr>
           </a:p>
         </p:txBody>
       </p:sp>
@@ -10451,11 +10409,6 @@
               </a:rPr>
               <a:t> is deployed within the museum in a local network.</a:t>
             </a:r>
-            <a:endParaRPr lang="en-US" dirty="0" smtClean="0">
-              <a:solidFill>
-                <a:srgbClr val="000000"/>
-              </a:solidFill>
-            </a:endParaRPr>
           </a:p>
           <a:p>
             <a:pPr marL="457200" marR="0" lvl="0" indent="-228600" algn="l" rtl="0">
@@ -10664,7 +10617,23 @@
                   <a:srgbClr val="000000"/>
                 </a:solidFill>
               </a:rPr>
-              <a:t>Environmental control: </a:t>
+              <a:t>Environmental control</a:t>
+            </a:r>
+            <a:r>
+              <a:rPr lang="en-US" smtClean="0">
+                <a:solidFill>
+                  <a:srgbClr val="000000"/>
+                </a:solidFill>
+              </a:rPr>
+              <a:t>: </a:t>
+            </a:r>
+            <a:r>
+              <a:rPr lang="en-US" smtClean="0">
+                <a:solidFill>
+                  <a:srgbClr val="000000"/>
+                </a:solidFill>
+              </a:rPr>
+              <a:t>Heating</a:t>
             </a:r>
             <a:r>
               <a:rPr lang="en-US" dirty="0">
@@ -10672,7 +10641,7 @@
                   <a:srgbClr val="000000"/>
                 </a:solidFill>
               </a:rPr>
-              <a:t>Hearing, ventilation, and air conditioning (HVAC) </a:t>
+              <a:t>, ventilation, and air conditioning (HVAC) </a:t>
             </a:r>
             <a:endParaRPr lang="en-US" dirty="0" smtClean="0">
               <a:solidFill>
@@ -10724,15 +10693,7 @@
                   <a:srgbClr val="000000"/>
                 </a:solidFill>
               </a:rPr>
-              <a:t>Sensors, controllers, and </a:t>
-            </a:r>
-            <a:r>
-              <a:rPr lang="en-US" dirty="0" smtClean="0">
-                <a:solidFill>
-                  <a:srgbClr val="000000"/>
-                </a:solidFill>
-              </a:rPr>
-              <a:t>monitors</a:t>
+              <a:t>Sensors, controllers, and monitors</a:t>
             </a:r>
           </a:p>
           <a:p>

</xml_diff>